<commit_message>
Oppdaterte koblingskjemaet sånn at det har med skipsong og lastsong. Kommenterte arduinokoden og oppdaterte setupen sånn at den har med pinMode for de nye pinsene. Endret også verdien for når det registreres som pause signal på ultralydsensoren istedenfor volumendring til å være kontrolert av minDistance
</commit_message>
<xml_diff>
--- a/koblingsskjema.pptx
+++ b/koblingsskjema.pptx
@@ -116,7 +116,7 @@
 <file path=ppt/revisionInfo.xml><?xml version="1.0" encoding="utf-8"?>
 <p1510:revInfo xmlns:a="http://schemas.openxmlformats.org/drawingml/2006/main" xmlns:r="http://schemas.openxmlformats.org/officeDocument/2006/relationships" xmlns:p1510="http://schemas.microsoft.com/office/powerpoint/2015/10/main">
   <p1510:revLst>
-    <p1510:client id="{6EF0C182-8B9A-4773-A139-DEDE527575EE}" v="2345" dt="2019-03-30T07:44:28.943"/>
+    <p1510:client id="{3412F954-559E-45CF-B92D-744CF964F5CF}" v="12" dt="2019-04-03T08:27:07.609"/>
   </p1510:revLst>
 </p1510:revInfo>
 </file>
@@ -4293,6 +4293,478 @@
             <pc:docMk/>
             <pc:sldMk cId="3208764681" sldId="257"/>
             <ac:cxnSpMk id="724" creationId="{210C2753-06AA-4123-B95A-E602E8036B46}"/>
+          </ac:cxnSpMkLst>
+        </pc:cxnChg>
+      </pc:sldChg>
+    </pc:docChg>
+  </pc:docChgLst>
+  <pc:docChgLst>
+    <pc:chgData name="Åsmund Runningen" userId="fcfce1d5-2d35-4b5c-86f4-e24bd46c268e" providerId="ADAL" clId="{3412F954-559E-45CF-B92D-744CF964F5CF}"/>
+    <pc:docChg chg="undo modSld">
+      <pc:chgData name="Åsmund Runningen" userId="fcfce1d5-2d35-4b5c-86f4-e24bd46c268e" providerId="ADAL" clId="{3412F954-559E-45CF-B92D-744CF964F5CF}" dt="2019-04-03T08:34:42.130" v="105" actId="14100"/>
+      <pc:docMkLst>
+        <pc:docMk/>
+      </pc:docMkLst>
+      <pc:sldChg chg="addSp modSp">
+        <pc:chgData name="Åsmund Runningen" userId="fcfce1d5-2d35-4b5c-86f4-e24bd46c268e" providerId="ADAL" clId="{3412F954-559E-45CF-B92D-744CF964F5CF}" dt="2019-04-03T08:34:42.130" v="105" actId="14100"/>
+        <pc:sldMkLst>
+          <pc:docMk/>
+          <pc:sldMk cId="3208764681" sldId="257"/>
+        </pc:sldMkLst>
+        <pc:grpChg chg="add mod ord">
+          <ac:chgData name="Åsmund Runningen" userId="fcfce1d5-2d35-4b5c-86f4-e24bd46c268e" providerId="ADAL" clId="{3412F954-559E-45CF-B92D-744CF964F5CF}" dt="2019-04-03T08:24:36.320" v="37" actId="1076"/>
+          <ac:grpSpMkLst>
+            <pc:docMk/>
+            <pc:sldMk cId="3208764681" sldId="257"/>
+            <ac:grpSpMk id="426" creationId="{4F22C6E4-A1CF-46A6-B8DE-03A7286B8339}"/>
+          </ac:grpSpMkLst>
+        </pc:grpChg>
+        <pc:grpChg chg="add mod ord">
+          <ac:chgData name="Åsmund Runningen" userId="fcfce1d5-2d35-4b5c-86f4-e24bd46c268e" providerId="ADAL" clId="{3412F954-559E-45CF-B92D-744CF964F5CF}" dt="2019-04-03T08:24:50.389" v="38" actId="1076"/>
+          <ac:grpSpMkLst>
+            <pc:docMk/>
+            <pc:sldMk cId="3208764681" sldId="257"/>
+            <ac:grpSpMk id="429" creationId="{CA33BCB0-827E-4480-9D30-22B245EB535C}"/>
+          </ac:grpSpMkLst>
+        </pc:grpChg>
+        <pc:cxnChg chg="mod">
+          <ac:chgData name="Åsmund Runningen" userId="fcfce1d5-2d35-4b5c-86f4-e24bd46c268e" providerId="ADAL" clId="{3412F954-559E-45CF-B92D-744CF964F5CF}" dt="2019-04-03T08:33:10.033" v="98" actId="1582"/>
+          <ac:cxnSpMkLst>
+            <pc:docMk/>
+            <pc:sldMk cId="3208764681" sldId="257"/>
+            <ac:cxnSpMk id="6" creationId="{4C2F5608-0186-4318-A268-B5CF9873A4A1}"/>
+          </ac:cxnSpMkLst>
+        </pc:cxnChg>
+        <pc:cxnChg chg="mod">
+          <ac:chgData name="Åsmund Runningen" userId="fcfce1d5-2d35-4b5c-86f4-e24bd46c268e" providerId="ADAL" clId="{3412F954-559E-45CF-B92D-744CF964F5CF}" dt="2019-04-03T08:33:19.733" v="99" actId="1582"/>
+          <ac:cxnSpMkLst>
+            <pc:docMk/>
+            <pc:sldMk cId="3208764681" sldId="257"/>
+            <ac:cxnSpMk id="7" creationId="{DAF066B3-B9D8-46B1-B4F3-A242DAB52A12}"/>
+          </ac:cxnSpMkLst>
+        </pc:cxnChg>
+        <pc:cxnChg chg="add mod">
+          <ac:chgData name="Åsmund Runningen" userId="fcfce1d5-2d35-4b5c-86f4-e24bd46c268e" providerId="ADAL" clId="{3412F954-559E-45CF-B92D-744CF964F5CF}" dt="2019-04-03T08:34:39.113" v="104" actId="14100"/>
+          <ac:cxnSpMkLst>
+            <pc:docMk/>
+            <pc:sldMk cId="3208764681" sldId="257"/>
+            <ac:cxnSpMk id="112" creationId="{92753665-97AA-4426-88BE-50925464D0FD}"/>
+          </ac:cxnSpMkLst>
+        </pc:cxnChg>
+        <pc:cxnChg chg="add mod">
+          <ac:chgData name="Åsmund Runningen" userId="fcfce1d5-2d35-4b5c-86f4-e24bd46c268e" providerId="ADAL" clId="{3412F954-559E-45CF-B92D-744CF964F5CF}" dt="2019-04-03T08:27:06.355" v="54" actId="11529"/>
+          <ac:cxnSpMkLst>
+            <pc:docMk/>
+            <pc:sldMk cId="3208764681" sldId="257"/>
+            <ac:cxnSpMk id="114" creationId="{86046894-32ED-430C-82E9-51C6EA9FD923}"/>
+          </ac:cxnSpMkLst>
+        </pc:cxnChg>
+        <pc:cxnChg chg="mod">
+          <ac:chgData name="Åsmund Runningen" userId="fcfce1d5-2d35-4b5c-86f4-e24bd46c268e" providerId="ADAL" clId="{3412F954-559E-45CF-B92D-744CF964F5CF}" dt="2019-04-03T08:28:17.424" v="65" actId="14100"/>
+          <ac:cxnSpMkLst>
+            <pc:docMk/>
+            <pc:sldMk cId="3208764681" sldId="257"/>
+            <ac:cxnSpMk id="180" creationId="{6B9902EB-0CAC-4705-AA02-98C4000E43DD}"/>
+          </ac:cxnSpMkLst>
+        </pc:cxnChg>
+        <pc:cxnChg chg="mod">
+          <ac:chgData name="Åsmund Runningen" userId="fcfce1d5-2d35-4b5c-86f4-e24bd46c268e" providerId="ADAL" clId="{3412F954-559E-45CF-B92D-744CF964F5CF}" dt="2019-04-03T08:22:46.281" v="17" actId="14100"/>
+          <ac:cxnSpMkLst>
+            <pc:docMk/>
+            <pc:sldMk cId="3208764681" sldId="257"/>
+            <ac:cxnSpMk id="182" creationId="{675CB585-DD65-4D96-A556-C1338289A1AD}"/>
+          </ac:cxnSpMkLst>
+        </pc:cxnChg>
+        <pc:cxnChg chg="mod">
+          <ac:chgData name="Åsmund Runningen" userId="fcfce1d5-2d35-4b5c-86f4-e24bd46c268e" providerId="ADAL" clId="{3412F954-559E-45CF-B92D-744CF964F5CF}" dt="2019-04-03T08:29:25.244" v="71" actId="1582"/>
+          <ac:cxnSpMkLst>
+            <pc:docMk/>
+            <pc:sldMk cId="3208764681" sldId="257"/>
+            <ac:cxnSpMk id="195" creationId="{4CF56912-851C-494F-AE75-02843E5E406C}"/>
+          </ac:cxnSpMkLst>
+        </pc:cxnChg>
+        <pc:cxnChg chg="mod">
+          <ac:chgData name="Åsmund Runningen" userId="fcfce1d5-2d35-4b5c-86f4-e24bd46c268e" providerId="ADAL" clId="{3412F954-559E-45CF-B92D-744CF964F5CF}" dt="2019-04-03T08:29:20.619" v="70" actId="1582"/>
+          <ac:cxnSpMkLst>
+            <pc:docMk/>
+            <pc:sldMk cId="3208764681" sldId="257"/>
+            <ac:cxnSpMk id="197" creationId="{A2B9FA53-4E65-4ACC-8EFB-19023912F62D}"/>
+          </ac:cxnSpMkLst>
+        </pc:cxnChg>
+        <pc:cxnChg chg="mod">
+          <ac:chgData name="Åsmund Runningen" userId="fcfce1d5-2d35-4b5c-86f4-e24bd46c268e" providerId="ADAL" clId="{3412F954-559E-45CF-B92D-744CF964F5CF}" dt="2019-04-03T08:29:36.169" v="72" actId="1582"/>
+          <ac:cxnSpMkLst>
+            <pc:docMk/>
+            <pc:sldMk cId="3208764681" sldId="257"/>
+            <ac:cxnSpMk id="199" creationId="{198F4475-6EE4-419F-81A3-71741E33EA04}"/>
+          </ac:cxnSpMkLst>
+        </pc:cxnChg>
+        <pc:cxnChg chg="mod">
+          <ac:chgData name="Åsmund Runningen" userId="fcfce1d5-2d35-4b5c-86f4-e24bd46c268e" providerId="ADAL" clId="{3412F954-559E-45CF-B92D-744CF964F5CF}" dt="2019-04-03T08:28:46.676" v="66" actId="1582"/>
+          <ac:cxnSpMkLst>
+            <pc:docMk/>
+            <pc:sldMk cId="3208764681" sldId="257"/>
+            <ac:cxnSpMk id="201" creationId="{4EB6BB39-27E4-40CA-9451-B80D7275FF9E}"/>
+          </ac:cxnSpMkLst>
+        </pc:cxnChg>
+        <pc:cxnChg chg="mod">
+          <ac:chgData name="Åsmund Runningen" userId="fcfce1d5-2d35-4b5c-86f4-e24bd46c268e" providerId="ADAL" clId="{3412F954-559E-45CF-B92D-744CF964F5CF}" dt="2019-04-03T08:28:59.737" v="67" actId="1582"/>
+          <ac:cxnSpMkLst>
+            <pc:docMk/>
+            <pc:sldMk cId="3208764681" sldId="257"/>
+            <ac:cxnSpMk id="218" creationId="{089AB48A-B0D4-4364-AB44-DC2220D18E7F}"/>
+          </ac:cxnSpMkLst>
+        </pc:cxnChg>
+        <pc:cxnChg chg="mod">
+          <ac:chgData name="Åsmund Runningen" userId="fcfce1d5-2d35-4b5c-86f4-e24bd46c268e" providerId="ADAL" clId="{3412F954-559E-45CF-B92D-744CF964F5CF}" dt="2019-04-03T08:29:15.176" v="69" actId="1582"/>
+          <ac:cxnSpMkLst>
+            <pc:docMk/>
+            <pc:sldMk cId="3208764681" sldId="257"/>
+            <ac:cxnSpMk id="221" creationId="{D585BCCD-2AE3-4A32-85E2-C41D4DF1DE39}"/>
+          </ac:cxnSpMkLst>
+        </pc:cxnChg>
+        <pc:cxnChg chg="mod">
+          <ac:chgData name="Åsmund Runningen" userId="fcfce1d5-2d35-4b5c-86f4-e24bd46c268e" providerId="ADAL" clId="{3412F954-559E-45CF-B92D-744CF964F5CF}" dt="2019-04-03T08:23:11.613" v="22" actId="14100"/>
+          <ac:cxnSpMkLst>
+            <pc:docMk/>
+            <pc:sldMk cId="3208764681" sldId="257"/>
+            <ac:cxnSpMk id="285" creationId="{5DB85B73-0B60-4ADB-AE2D-0493B0FE2414}"/>
+          </ac:cxnSpMkLst>
+        </pc:cxnChg>
+        <pc:cxnChg chg="mod">
+          <ac:chgData name="Åsmund Runningen" userId="fcfce1d5-2d35-4b5c-86f4-e24bd46c268e" providerId="ADAL" clId="{3412F954-559E-45CF-B92D-744CF964F5CF}" dt="2019-04-03T08:23:20.166" v="23" actId="14100"/>
+          <ac:cxnSpMkLst>
+            <pc:docMk/>
+            <pc:sldMk cId="3208764681" sldId="257"/>
+            <ac:cxnSpMk id="287" creationId="{5937B60A-2E3E-4755-8D11-E4A332A620D7}"/>
+          </ac:cxnSpMkLst>
+        </pc:cxnChg>
+        <pc:cxnChg chg="mod">
+          <ac:chgData name="Åsmund Runningen" userId="fcfce1d5-2d35-4b5c-86f4-e24bd46c268e" providerId="ADAL" clId="{3412F954-559E-45CF-B92D-744CF964F5CF}" dt="2019-04-03T08:28:13.009" v="64" actId="14100"/>
+          <ac:cxnSpMkLst>
+            <pc:docMk/>
+            <pc:sldMk cId="3208764681" sldId="257"/>
+            <ac:cxnSpMk id="291" creationId="{0F7756C0-3674-4BF3-ABA6-9531908ABFE3}"/>
+          </ac:cxnSpMkLst>
+        </pc:cxnChg>
+        <pc:cxnChg chg="mod">
+          <ac:chgData name="Åsmund Runningen" userId="fcfce1d5-2d35-4b5c-86f4-e24bd46c268e" providerId="ADAL" clId="{3412F954-559E-45CF-B92D-744CF964F5CF}" dt="2019-04-03T08:22:51.354" v="18" actId="14100"/>
+          <ac:cxnSpMkLst>
+            <pc:docMk/>
+            <pc:sldMk cId="3208764681" sldId="257"/>
+            <ac:cxnSpMk id="293" creationId="{97CB4630-8303-45B4-AD7A-976C8DBD297F}"/>
+          </ac:cxnSpMkLst>
+        </pc:cxnChg>
+        <pc:cxnChg chg="mod">
+          <ac:chgData name="Åsmund Runningen" userId="fcfce1d5-2d35-4b5c-86f4-e24bd46c268e" providerId="ADAL" clId="{3412F954-559E-45CF-B92D-744CF964F5CF}" dt="2019-04-03T08:30:21.869" v="78" actId="1582"/>
+          <ac:cxnSpMkLst>
+            <pc:docMk/>
+            <pc:sldMk cId="3208764681" sldId="257"/>
+            <ac:cxnSpMk id="334" creationId="{535C6BEA-7A4D-408A-BC7B-B7F2C2F3E979}"/>
+          </ac:cxnSpMkLst>
+        </pc:cxnChg>
+        <pc:cxnChg chg="mod">
+          <ac:chgData name="Åsmund Runningen" userId="fcfce1d5-2d35-4b5c-86f4-e24bd46c268e" providerId="ADAL" clId="{3412F954-559E-45CF-B92D-744CF964F5CF}" dt="2019-04-03T08:30:15.685" v="77" actId="1582"/>
+          <ac:cxnSpMkLst>
+            <pc:docMk/>
+            <pc:sldMk cId="3208764681" sldId="257"/>
+            <ac:cxnSpMk id="338" creationId="{4BFC079D-8EA5-4581-9E49-C8581F450FB8}"/>
+          </ac:cxnSpMkLst>
+        </pc:cxnChg>
+        <pc:cxnChg chg="mod">
+          <ac:chgData name="Åsmund Runningen" userId="fcfce1d5-2d35-4b5c-86f4-e24bd46c268e" providerId="ADAL" clId="{3412F954-559E-45CF-B92D-744CF964F5CF}" dt="2019-04-03T08:29:07.655" v="68" actId="1582"/>
+          <ac:cxnSpMkLst>
+            <pc:docMk/>
+            <pc:sldMk cId="3208764681" sldId="257"/>
+            <ac:cxnSpMk id="341" creationId="{1478809B-414B-4EDF-8192-0E4139E9430D}"/>
+          </ac:cxnSpMkLst>
+        </pc:cxnChg>
+        <pc:cxnChg chg="mod">
+          <ac:chgData name="Åsmund Runningen" userId="fcfce1d5-2d35-4b5c-86f4-e24bd46c268e" providerId="ADAL" clId="{3412F954-559E-45CF-B92D-744CF964F5CF}" dt="2019-04-03T08:31:57.710" v="89" actId="1582"/>
+          <ac:cxnSpMkLst>
+            <pc:docMk/>
+            <pc:sldMk cId="3208764681" sldId="257"/>
+            <ac:cxnSpMk id="342" creationId="{AEFA5A8A-E270-4207-9DC4-4A30E58CDD34}"/>
+          </ac:cxnSpMkLst>
+        </pc:cxnChg>
+        <pc:cxnChg chg="mod">
+          <ac:chgData name="Åsmund Runningen" userId="fcfce1d5-2d35-4b5c-86f4-e24bd46c268e" providerId="ADAL" clId="{3412F954-559E-45CF-B92D-744CF964F5CF}" dt="2019-04-03T08:31:52.112" v="88" actId="1582"/>
+          <ac:cxnSpMkLst>
+            <pc:docMk/>
+            <pc:sldMk cId="3208764681" sldId="257"/>
+            <ac:cxnSpMk id="344" creationId="{DBBDFB3D-B41D-4A59-8B0F-CA3DD1915B50}"/>
+          </ac:cxnSpMkLst>
+        </pc:cxnChg>
+        <pc:cxnChg chg="add mod">
+          <ac:chgData name="Åsmund Runningen" userId="fcfce1d5-2d35-4b5c-86f4-e24bd46c268e" providerId="ADAL" clId="{3412F954-559E-45CF-B92D-744CF964F5CF}" dt="2019-04-03T08:24:17.736" v="33" actId="1076"/>
+          <ac:cxnSpMkLst>
+            <pc:docMk/>
+            <pc:sldMk cId="3208764681" sldId="257"/>
+            <ac:cxnSpMk id="432" creationId="{6F8CE550-6A49-4A28-827D-CC3A6AEE34C9}"/>
+          </ac:cxnSpMkLst>
+        </pc:cxnChg>
+        <pc:cxnChg chg="add mod">
+          <ac:chgData name="Åsmund Runningen" userId="fcfce1d5-2d35-4b5c-86f4-e24bd46c268e" providerId="ADAL" clId="{3412F954-559E-45CF-B92D-744CF964F5CF}" dt="2019-04-03T08:24:23.552" v="35" actId="1076"/>
+          <ac:cxnSpMkLst>
+            <pc:docMk/>
+            <pc:sldMk cId="3208764681" sldId="257"/>
+            <ac:cxnSpMk id="434" creationId="{1925CAF6-9C19-4D79-8B3C-C5D375D4AA9F}"/>
+          </ac:cxnSpMkLst>
+        </pc:cxnChg>
+        <pc:cxnChg chg="add mod">
+          <ac:chgData name="Åsmund Runningen" userId="fcfce1d5-2d35-4b5c-86f4-e24bd46c268e" providerId="ADAL" clId="{3412F954-559E-45CF-B92D-744CF964F5CF}" dt="2019-04-03T08:34:33.363" v="103" actId="14100"/>
+          <ac:cxnSpMkLst>
+            <pc:docMk/>
+            <pc:sldMk cId="3208764681" sldId="257"/>
+            <ac:cxnSpMk id="435" creationId="{85266B9B-E7DD-412C-90E1-C02F66149840}"/>
+          </ac:cxnSpMkLst>
+        </pc:cxnChg>
+        <pc:cxnChg chg="add mod">
+          <ac:chgData name="Åsmund Runningen" userId="fcfce1d5-2d35-4b5c-86f4-e24bd46c268e" providerId="ADAL" clId="{3412F954-559E-45CF-B92D-744CF964F5CF}" dt="2019-04-03T08:34:28.006" v="102" actId="14100"/>
+          <ac:cxnSpMkLst>
+            <pc:docMk/>
+            <pc:sldMk cId="3208764681" sldId="257"/>
+            <ac:cxnSpMk id="437" creationId="{6398E7B1-8DE4-4653-9E69-97E437809541}"/>
+          </ac:cxnSpMkLst>
+        </pc:cxnChg>
+        <pc:cxnChg chg="add mod">
+          <ac:chgData name="Åsmund Runningen" userId="fcfce1d5-2d35-4b5c-86f4-e24bd46c268e" providerId="ADAL" clId="{3412F954-559E-45CF-B92D-744CF964F5CF}" dt="2019-04-03T08:34:14.468" v="100" actId="1076"/>
+          <ac:cxnSpMkLst>
+            <pc:docMk/>
+            <pc:sldMk cId="3208764681" sldId="257"/>
+            <ac:cxnSpMk id="439" creationId="{B176A15A-F775-4252-A113-40E84AAC2459}"/>
+          </ac:cxnSpMkLst>
+        </pc:cxnChg>
+        <pc:cxnChg chg="add mod">
+          <ac:chgData name="Åsmund Runningen" userId="fcfce1d5-2d35-4b5c-86f4-e24bd46c268e" providerId="ADAL" clId="{3412F954-559E-45CF-B92D-744CF964F5CF}" dt="2019-04-03T08:34:19.061" v="101" actId="1076"/>
+          <ac:cxnSpMkLst>
+            <pc:docMk/>
+            <pc:sldMk cId="3208764681" sldId="257"/>
+            <ac:cxnSpMk id="441" creationId="{D807C399-8CC1-4060-811F-C09E3E75290D}"/>
+          </ac:cxnSpMkLst>
+        </pc:cxnChg>
+        <pc:cxnChg chg="add mod">
+          <ac:chgData name="Åsmund Runningen" userId="fcfce1d5-2d35-4b5c-86f4-e24bd46c268e" providerId="ADAL" clId="{3412F954-559E-45CF-B92D-744CF964F5CF}" dt="2019-04-03T08:34:42.130" v="105" actId="14100"/>
+          <ac:cxnSpMkLst>
+            <pc:docMk/>
+            <pc:sldMk cId="3208764681" sldId="257"/>
+            <ac:cxnSpMk id="444" creationId="{97897636-994D-432E-A66A-44B58978E88D}"/>
+          </ac:cxnSpMkLst>
+        </pc:cxnChg>
+        <pc:cxnChg chg="add mod">
+          <ac:chgData name="Åsmund Runningen" userId="fcfce1d5-2d35-4b5c-86f4-e24bd46c268e" providerId="ADAL" clId="{3412F954-559E-45CF-B92D-744CF964F5CF}" dt="2019-04-03T08:27:28.412" v="60" actId="14100"/>
+          <ac:cxnSpMkLst>
+            <pc:docMk/>
+            <pc:sldMk cId="3208764681" sldId="257"/>
+            <ac:cxnSpMk id="447" creationId="{59E36311-8E2F-4595-B4C8-4E16C265BB94}"/>
+          </ac:cxnSpMkLst>
+        </pc:cxnChg>
+        <pc:cxnChg chg="mod">
+          <ac:chgData name="Åsmund Runningen" userId="fcfce1d5-2d35-4b5c-86f4-e24bd46c268e" providerId="ADAL" clId="{3412F954-559E-45CF-B92D-744CF964F5CF}" dt="2019-04-03T08:21:35.248" v="12" actId="1076"/>
+          <ac:cxnSpMkLst>
+            <pc:docMk/>
+            <pc:sldMk cId="3208764681" sldId="257"/>
+            <ac:cxnSpMk id="480" creationId="{DDCD0502-9E39-4C04-B2CC-65DC0E8957B8}"/>
+          </ac:cxnSpMkLst>
+        </pc:cxnChg>
+        <pc:cxnChg chg="mod">
+          <ac:chgData name="Åsmund Runningen" userId="fcfce1d5-2d35-4b5c-86f4-e24bd46c268e" providerId="ADAL" clId="{3412F954-559E-45CF-B92D-744CF964F5CF}" dt="2019-04-03T08:29:55.153" v="74" actId="1582"/>
+          <ac:cxnSpMkLst>
+            <pc:docMk/>
+            <pc:sldMk cId="3208764681" sldId="257"/>
+            <ac:cxnSpMk id="542" creationId="{A63763DE-A7B2-4EC2-B4BF-F3B73BB35EA9}"/>
+          </ac:cxnSpMkLst>
+        </pc:cxnChg>
+        <pc:cxnChg chg="mod">
+          <ac:chgData name="Åsmund Runningen" userId="fcfce1d5-2d35-4b5c-86f4-e24bd46c268e" providerId="ADAL" clId="{3412F954-559E-45CF-B92D-744CF964F5CF}" dt="2019-04-03T08:29:42.218" v="73" actId="1582"/>
+          <ac:cxnSpMkLst>
+            <pc:docMk/>
+            <pc:sldMk cId="3208764681" sldId="257"/>
+            <ac:cxnSpMk id="545" creationId="{3BABEAAE-6960-4397-A6E2-B2ECA8480318}"/>
+          </ac:cxnSpMkLst>
+        </pc:cxnChg>
+        <pc:cxnChg chg="mod">
+          <ac:chgData name="Åsmund Runningen" userId="fcfce1d5-2d35-4b5c-86f4-e24bd46c268e" providerId="ADAL" clId="{3412F954-559E-45CF-B92D-744CF964F5CF}" dt="2019-04-03T08:30:04.642" v="76" actId="1582"/>
+          <ac:cxnSpMkLst>
+            <pc:docMk/>
+            <pc:sldMk cId="3208764681" sldId="257"/>
+            <ac:cxnSpMk id="548" creationId="{655B3B9D-93C1-4221-A4EA-BEDE56611D32}"/>
+          </ac:cxnSpMkLst>
+        </pc:cxnChg>
+        <pc:cxnChg chg="mod">
+          <ac:chgData name="Åsmund Runningen" userId="fcfce1d5-2d35-4b5c-86f4-e24bd46c268e" providerId="ADAL" clId="{3412F954-559E-45CF-B92D-744CF964F5CF}" dt="2019-04-03T08:29:59.531" v="75" actId="1582"/>
+          <ac:cxnSpMkLst>
+            <pc:docMk/>
+            <pc:sldMk cId="3208764681" sldId="257"/>
+            <ac:cxnSpMk id="549" creationId="{D5F7D518-58BC-4E4A-B1D5-823F09D27C10}"/>
+          </ac:cxnSpMkLst>
+        </pc:cxnChg>
+        <pc:cxnChg chg="mod">
+          <ac:chgData name="Åsmund Runningen" userId="fcfce1d5-2d35-4b5c-86f4-e24bd46c268e" providerId="ADAL" clId="{3412F954-559E-45CF-B92D-744CF964F5CF}" dt="2019-04-03T08:31:31.129" v="85" actId="1582"/>
+          <ac:cxnSpMkLst>
+            <pc:docMk/>
+            <pc:sldMk cId="3208764681" sldId="257"/>
+            <ac:cxnSpMk id="555" creationId="{0BE68EA6-DED9-4E92-9BE0-ADB663B0B512}"/>
+          </ac:cxnSpMkLst>
+        </pc:cxnChg>
+        <pc:cxnChg chg="mod">
+          <ac:chgData name="Åsmund Runningen" userId="fcfce1d5-2d35-4b5c-86f4-e24bd46c268e" providerId="ADAL" clId="{3412F954-559E-45CF-B92D-744CF964F5CF}" dt="2019-04-03T08:31:17.604" v="83" actId="1582"/>
+          <ac:cxnSpMkLst>
+            <pc:docMk/>
+            <pc:sldMk cId="3208764681" sldId="257"/>
+            <ac:cxnSpMk id="560" creationId="{BA209C5D-122A-4E46-A23A-506D38E65DEC}"/>
+          </ac:cxnSpMkLst>
+        </pc:cxnChg>
+        <pc:cxnChg chg="mod">
+          <ac:chgData name="Åsmund Runningen" userId="fcfce1d5-2d35-4b5c-86f4-e24bd46c268e" providerId="ADAL" clId="{3412F954-559E-45CF-B92D-744CF964F5CF}" dt="2019-04-03T08:31:24.793" v="84" actId="1582"/>
+          <ac:cxnSpMkLst>
+            <pc:docMk/>
+            <pc:sldMk cId="3208764681" sldId="257"/>
+            <ac:cxnSpMk id="563" creationId="{D87AEFAB-70AC-436F-B655-353225CD7D0C}"/>
+          </ac:cxnSpMkLst>
+        </pc:cxnChg>
+        <pc:cxnChg chg="mod">
+          <ac:chgData name="Åsmund Runningen" userId="fcfce1d5-2d35-4b5c-86f4-e24bd46c268e" providerId="ADAL" clId="{3412F954-559E-45CF-B92D-744CF964F5CF}" dt="2019-04-03T08:31:06.804" v="82" actId="1582"/>
+          <ac:cxnSpMkLst>
+            <pc:docMk/>
+            <pc:sldMk cId="3208764681" sldId="257"/>
+            <ac:cxnSpMk id="565" creationId="{546340D9-1630-40B4-9299-355C49D7DBBD}"/>
+          </ac:cxnSpMkLst>
+        </pc:cxnChg>
+        <pc:cxnChg chg="mod">
+          <ac:chgData name="Åsmund Runningen" userId="fcfce1d5-2d35-4b5c-86f4-e24bd46c268e" providerId="ADAL" clId="{3412F954-559E-45CF-B92D-744CF964F5CF}" dt="2019-04-03T08:31:00.956" v="81" actId="1582"/>
+          <ac:cxnSpMkLst>
+            <pc:docMk/>
+            <pc:sldMk cId="3208764681" sldId="257"/>
+            <ac:cxnSpMk id="570" creationId="{0AE3AA31-8866-444D-A5C4-4B082C32B082}"/>
+          </ac:cxnSpMkLst>
+        </pc:cxnChg>
+        <pc:cxnChg chg="mod">
+          <ac:chgData name="Åsmund Runningen" userId="fcfce1d5-2d35-4b5c-86f4-e24bd46c268e" providerId="ADAL" clId="{3412F954-559E-45CF-B92D-744CF964F5CF}" dt="2019-04-03T08:30:55.520" v="80" actId="1582"/>
+          <ac:cxnSpMkLst>
+            <pc:docMk/>
+            <pc:sldMk cId="3208764681" sldId="257"/>
+            <ac:cxnSpMk id="573" creationId="{2FC6E9F5-40A4-4A93-A617-417FAF1015D3}"/>
+          </ac:cxnSpMkLst>
+        </pc:cxnChg>
+        <pc:cxnChg chg="mod">
+          <ac:chgData name="Åsmund Runningen" userId="fcfce1d5-2d35-4b5c-86f4-e24bd46c268e" providerId="ADAL" clId="{3412F954-559E-45CF-B92D-744CF964F5CF}" dt="2019-04-03T08:30:50.237" v="79" actId="1582"/>
+          <ac:cxnSpMkLst>
+            <pc:docMk/>
+            <pc:sldMk cId="3208764681" sldId="257"/>
+            <ac:cxnSpMk id="579" creationId="{83B2E2F8-0B8A-4FDA-AE6B-602571024108}"/>
+          </ac:cxnSpMkLst>
+        </pc:cxnChg>
+        <pc:cxnChg chg="mod">
+          <ac:chgData name="Åsmund Runningen" userId="fcfce1d5-2d35-4b5c-86f4-e24bd46c268e" providerId="ADAL" clId="{3412F954-559E-45CF-B92D-744CF964F5CF}" dt="2019-04-03T08:31:37.542" v="86" actId="1582"/>
+          <ac:cxnSpMkLst>
+            <pc:docMk/>
+            <pc:sldMk cId="3208764681" sldId="257"/>
+            <ac:cxnSpMk id="581" creationId="{34AF4258-37C2-498E-9BC4-2E216684182D}"/>
+          </ac:cxnSpMkLst>
+        </pc:cxnChg>
+        <pc:cxnChg chg="mod">
+          <ac:chgData name="Åsmund Runningen" userId="fcfce1d5-2d35-4b5c-86f4-e24bd46c268e" providerId="ADAL" clId="{3412F954-559E-45CF-B92D-744CF964F5CF}" dt="2019-04-03T08:20:21.420" v="0" actId="1076"/>
+          <ac:cxnSpMkLst>
+            <pc:docMk/>
+            <pc:sldMk cId="3208764681" sldId="257"/>
+            <ac:cxnSpMk id="718" creationId="{029D23E5-170F-4CBD-9135-663AAF21B8BB}"/>
+          </ac:cxnSpMkLst>
+        </pc:cxnChg>
+        <pc:cxnChg chg="mod">
+          <ac:chgData name="Åsmund Runningen" userId="fcfce1d5-2d35-4b5c-86f4-e24bd46c268e" providerId="ADAL" clId="{3412F954-559E-45CF-B92D-744CF964F5CF}" dt="2019-04-03T08:20:42.677" v="4" actId="14100"/>
+          <ac:cxnSpMkLst>
+            <pc:docMk/>
+            <pc:sldMk cId="3208764681" sldId="257"/>
+            <ac:cxnSpMk id="720" creationId="{A93505AC-2B3F-43FE-8D69-86894D890372}"/>
+          </ac:cxnSpMkLst>
+        </pc:cxnChg>
+        <pc:cxnChg chg="mod">
+          <ac:chgData name="Åsmund Runningen" userId="fcfce1d5-2d35-4b5c-86f4-e24bd46c268e" providerId="ADAL" clId="{3412F954-559E-45CF-B92D-744CF964F5CF}" dt="2019-04-03T08:20:56.078" v="6" actId="14100"/>
+          <ac:cxnSpMkLst>
+            <pc:docMk/>
+            <pc:sldMk cId="3208764681" sldId="257"/>
+            <ac:cxnSpMk id="721" creationId="{3ABA9F76-9912-4B7B-B540-15904049AAF4}"/>
+          </ac:cxnSpMkLst>
+        </pc:cxnChg>
+        <pc:cxnChg chg="mod">
+          <ac:chgData name="Åsmund Runningen" userId="fcfce1d5-2d35-4b5c-86f4-e24bd46c268e" providerId="ADAL" clId="{3412F954-559E-45CF-B92D-744CF964F5CF}" dt="2019-04-03T08:20:52.499" v="5" actId="1076"/>
+          <ac:cxnSpMkLst>
+            <pc:docMk/>
+            <pc:sldMk cId="3208764681" sldId="257"/>
+            <ac:cxnSpMk id="723" creationId="{671733A5-C2F5-4ECC-BBCD-949FB68D9DA7}"/>
+          </ac:cxnSpMkLst>
+        </pc:cxnChg>
+        <pc:cxnChg chg="mod">
+          <ac:chgData name="Åsmund Runningen" userId="fcfce1d5-2d35-4b5c-86f4-e24bd46c268e" providerId="ADAL" clId="{3412F954-559E-45CF-B92D-744CF964F5CF}" dt="2019-04-03T08:27:59.425" v="63" actId="14100"/>
+          <ac:cxnSpMkLst>
+            <pc:docMk/>
+            <pc:sldMk cId="3208764681" sldId="257"/>
+            <ac:cxnSpMk id="725" creationId="{5BFFEDDA-AFE7-4659-B86A-09FAA2CD35B4}"/>
+          </ac:cxnSpMkLst>
+        </pc:cxnChg>
+        <pc:cxnChg chg="mod">
+          <ac:chgData name="Åsmund Runningen" userId="fcfce1d5-2d35-4b5c-86f4-e24bd46c268e" providerId="ADAL" clId="{3412F954-559E-45CF-B92D-744CF964F5CF}" dt="2019-04-03T08:20:35.795" v="3" actId="14100"/>
+          <ac:cxnSpMkLst>
+            <pc:docMk/>
+            <pc:sldMk cId="3208764681" sldId="257"/>
+            <ac:cxnSpMk id="800" creationId="{23A64D68-3FBF-4A6D-9E07-A80158AC14CB}"/>
+          </ac:cxnSpMkLst>
+        </pc:cxnChg>
+        <pc:cxnChg chg="mod">
+          <ac:chgData name="Åsmund Runningen" userId="fcfce1d5-2d35-4b5c-86f4-e24bd46c268e" providerId="ADAL" clId="{3412F954-559E-45CF-B92D-744CF964F5CF}" dt="2019-04-03T08:21:11.022" v="11" actId="14100"/>
+          <ac:cxnSpMkLst>
+            <pc:docMk/>
+            <pc:sldMk cId="3208764681" sldId="257"/>
+            <ac:cxnSpMk id="803" creationId="{858B40C6-2DC0-4775-A230-E56AA4FC4969}"/>
+          </ac:cxnSpMkLst>
+        </pc:cxnChg>
+        <pc:cxnChg chg="mod">
+          <ac:chgData name="Åsmund Runningen" userId="fcfce1d5-2d35-4b5c-86f4-e24bd46c268e" providerId="ADAL" clId="{3412F954-559E-45CF-B92D-744CF964F5CF}" dt="2019-04-03T08:27:50.053" v="62" actId="14100"/>
+          <ac:cxnSpMkLst>
+            <pc:docMk/>
+            <pc:sldMk cId="3208764681" sldId="257"/>
+            <ac:cxnSpMk id="805" creationId="{5A03DE42-D9E4-410E-AA82-2DCB8E7AA09C}"/>
+          </ac:cxnSpMkLst>
+        </pc:cxnChg>
+        <pc:cxnChg chg="mod">
+          <ac:chgData name="Åsmund Runningen" userId="fcfce1d5-2d35-4b5c-86f4-e24bd46c268e" providerId="ADAL" clId="{3412F954-559E-45CF-B92D-744CF964F5CF}" dt="2019-04-03T08:32:04.476" v="90" actId="13822"/>
+          <ac:cxnSpMkLst>
+            <pc:docMk/>
+            <pc:sldMk cId="3208764681" sldId="257"/>
+            <ac:cxnSpMk id="822" creationId="{295438C4-8283-4746-BF2A-8BF887B102CE}"/>
+          </ac:cxnSpMkLst>
+        </pc:cxnChg>
+        <pc:cxnChg chg="mod">
+          <ac:chgData name="Åsmund Runningen" userId="fcfce1d5-2d35-4b5c-86f4-e24bd46c268e" providerId="ADAL" clId="{3412F954-559E-45CF-B92D-744CF964F5CF}" dt="2019-04-03T08:32:23.784" v="94" actId="13822"/>
+          <ac:cxnSpMkLst>
+            <pc:docMk/>
+            <pc:sldMk cId="3208764681" sldId="257"/>
+            <ac:cxnSpMk id="829" creationId="{E93A73BC-25B2-4452-8CB9-6AE72988BD88}"/>
+          </ac:cxnSpMkLst>
+        </pc:cxnChg>
+        <pc:cxnChg chg="mod">
+          <ac:chgData name="Åsmund Runningen" userId="fcfce1d5-2d35-4b5c-86f4-e24bd46c268e" providerId="ADAL" clId="{3412F954-559E-45CF-B92D-744CF964F5CF}" dt="2019-04-03T08:32:13.253" v="92" actId="13822"/>
+          <ac:cxnSpMkLst>
+            <pc:docMk/>
+            <pc:sldMk cId="3208764681" sldId="257"/>
+            <ac:cxnSpMk id="831" creationId="{F34367E7-C1A0-4F0B-A09A-B7F573E26D18}"/>
+          </ac:cxnSpMkLst>
+        </pc:cxnChg>
+        <pc:cxnChg chg="mod">
+          <ac:chgData name="Åsmund Runningen" userId="fcfce1d5-2d35-4b5c-86f4-e24bd46c268e" providerId="ADAL" clId="{3412F954-559E-45CF-B92D-744CF964F5CF}" dt="2019-04-03T08:32:17.196" v="93" actId="13822"/>
+          <ac:cxnSpMkLst>
+            <pc:docMk/>
+            <pc:sldMk cId="3208764681" sldId="257"/>
+            <ac:cxnSpMk id="833" creationId="{728327AD-3E7B-4CA3-9F74-FF1065B41E73}"/>
+          </ac:cxnSpMkLst>
+        </pc:cxnChg>
+        <pc:cxnChg chg="mod">
+          <ac:chgData name="Åsmund Runningen" userId="fcfce1d5-2d35-4b5c-86f4-e24bd46c268e" providerId="ADAL" clId="{3412F954-559E-45CF-B92D-744CF964F5CF}" dt="2019-04-03T08:32:07.869" v="91" actId="13822"/>
+          <ac:cxnSpMkLst>
+            <pc:docMk/>
+            <pc:sldMk cId="3208764681" sldId="257"/>
+            <ac:cxnSpMk id="840" creationId="{0EED3A4A-4824-4381-A4E6-2940F53F9862}"/>
           </ac:cxnSpMkLst>
         </pc:cxnChg>
       </pc:sldChg>
@@ -4448,7 +4920,7 @@
           <a:p>
             <a:fld id="{2600B228-7220-42E5-A09C-E378A7498FF5}" type="datetimeFigureOut">
               <a:rPr lang="nb-NO" smtClean="0"/>
-              <a:t>30.03.2019</a:t>
+              <a:t>03.04.2019</a:t>
             </a:fld>
             <a:endParaRPr lang="nb-NO"/>
           </a:p>
@@ -4646,7 +5118,7 @@
           <a:p>
             <a:fld id="{2600B228-7220-42E5-A09C-E378A7498FF5}" type="datetimeFigureOut">
               <a:rPr lang="nb-NO" smtClean="0"/>
-              <a:t>30.03.2019</a:t>
+              <a:t>03.04.2019</a:t>
             </a:fld>
             <a:endParaRPr lang="nb-NO"/>
           </a:p>
@@ -4854,7 +5326,7 @@
           <a:p>
             <a:fld id="{2600B228-7220-42E5-A09C-E378A7498FF5}" type="datetimeFigureOut">
               <a:rPr lang="nb-NO" smtClean="0"/>
-              <a:t>30.03.2019</a:t>
+              <a:t>03.04.2019</a:t>
             </a:fld>
             <a:endParaRPr lang="nb-NO"/>
           </a:p>
@@ -5052,7 +5524,7 @@
           <a:p>
             <a:fld id="{2600B228-7220-42E5-A09C-E378A7498FF5}" type="datetimeFigureOut">
               <a:rPr lang="nb-NO" smtClean="0"/>
-              <a:t>30.03.2019</a:t>
+              <a:t>03.04.2019</a:t>
             </a:fld>
             <a:endParaRPr lang="nb-NO"/>
           </a:p>
@@ -5327,7 +5799,7 @@
           <a:p>
             <a:fld id="{2600B228-7220-42E5-A09C-E378A7498FF5}" type="datetimeFigureOut">
               <a:rPr lang="nb-NO" smtClean="0"/>
-              <a:t>30.03.2019</a:t>
+              <a:t>03.04.2019</a:t>
             </a:fld>
             <a:endParaRPr lang="nb-NO"/>
           </a:p>
@@ -5592,7 +6064,7 @@
           <a:p>
             <a:fld id="{2600B228-7220-42E5-A09C-E378A7498FF5}" type="datetimeFigureOut">
               <a:rPr lang="nb-NO" smtClean="0"/>
-              <a:t>30.03.2019</a:t>
+              <a:t>03.04.2019</a:t>
             </a:fld>
             <a:endParaRPr lang="nb-NO"/>
           </a:p>
@@ -6004,7 +6476,7 @@
           <a:p>
             <a:fld id="{2600B228-7220-42E5-A09C-E378A7498FF5}" type="datetimeFigureOut">
               <a:rPr lang="nb-NO" smtClean="0"/>
-              <a:t>30.03.2019</a:t>
+              <a:t>03.04.2019</a:t>
             </a:fld>
             <a:endParaRPr lang="nb-NO"/>
           </a:p>
@@ -6145,7 +6617,7 @@
           <a:p>
             <a:fld id="{2600B228-7220-42E5-A09C-E378A7498FF5}" type="datetimeFigureOut">
               <a:rPr lang="nb-NO" smtClean="0"/>
-              <a:t>30.03.2019</a:t>
+              <a:t>03.04.2019</a:t>
             </a:fld>
             <a:endParaRPr lang="nb-NO"/>
           </a:p>
@@ -6258,7 +6730,7 @@
           <a:p>
             <a:fld id="{2600B228-7220-42E5-A09C-E378A7498FF5}" type="datetimeFigureOut">
               <a:rPr lang="nb-NO" smtClean="0"/>
-              <a:t>30.03.2019</a:t>
+              <a:t>03.04.2019</a:t>
             </a:fld>
             <a:endParaRPr lang="nb-NO"/>
           </a:p>
@@ -6569,7 +7041,7 @@
           <a:p>
             <a:fld id="{2600B228-7220-42E5-A09C-E378A7498FF5}" type="datetimeFigureOut">
               <a:rPr lang="nb-NO" smtClean="0"/>
-              <a:t>30.03.2019</a:t>
+              <a:t>03.04.2019</a:t>
             </a:fld>
             <a:endParaRPr lang="nb-NO"/>
           </a:p>
@@ -6857,7 +7329,7 @@
           <a:p>
             <a:fld id="{2600B228-7220-42E5-A09C-E378A7498FF5}" type="datetimeFigureOut">
               <a:rPr lang="nb-NO" smtClean="0"/>
-              <a:t>30.03.2019</a:t>
+              <a:t>03.04.2019</a:t>
             </a:fld>
             <a:endParaRPr lang="nb-NO"/>
           </a:p>
@@ -7098,7 +7570,7 @@
           <a:p>
             <a:fld id="{2600B228-7220-42E5-A09C-E378A7498FF5}" type="datetimeFigureOut">
               <a:rPr lang="nb-NO" smtClean="0"/>
-              <a:t>30.03.2019</a:t>
+              <a:t>03.04.2019</a:t>
             </a:fld>
             <a:endParaRPr lang="nb-NO"/>
           </a:p>
@@ -19288,6 +19760,234 @@
       </p:grpSpPr>
       <p:grpSp>
         <p:nvGrpSpPr>
+          <p:cNvPr id="429" name="Gruppe 428">
+            <a:extLst>
+              <a:ext uri="{FF2B5EF4-FFF2-40B4-BE49-F238E27FC236}">
+                <a16:creationId xmlns:a16="http://schemas.microsoft.com/office/drawing/2014/main" id="{CA33BCB0-827E-4480-9D30-22B245EB535C}"/>
+              </a:ext>
+            </a:extLst>
+          </p:cNvPr>
+          <p:cNvGrpSpPr/>
+          <p:nvPr/>
+        </p:nvGrpSpPr>
+        <p:grpSpPr>
+          <a:xfrm rot="16200000">
+            <a:off x="6994275" y="4134325"/>
+            <a:ext cx="307747" cy="366694"/>
+            <a:chOff x="6142922" y="2839015"/>
+            <a:chExt cx="399212" cy="475679"/>
+          </a:xfrm>
+        </p:grpSpPr>
+        <p:sp>
+          <p:nvSpPr>
+            <p:cNvPr id="430" name="Ellipse 429">
+              <a:extLst>
+                <a:ext uri="{FF2B5EF4-FFF2-40B4-BE49-F238E27FC236}">
+                  <a16:creationId xmlns:a16="http://schemas.microsoft.com/office/drawing/2014/main" id="{09E5D2DD-C44F-4978-A093-C5F921B46CFC}"/>
+                </a:ext>
+              </a:extLst>
+            </p:cNvPr>
+            <p:cNvSpPr/>
+            <p:nvPr/>
+          </p:nvSpPr>
+          <p:spPr>
+            <a:xfrm>
+              <a:off x="6177467" y="2898468"/>
+              <a:ext cx="364667" cy="364667"/>
+            </a:xfrm>
+            <a:prstGeom prst="ellipse">
+              <a:avLst/>
+            </a:prstGeom>
+          </p:spPr>
+          <p:style>
+            <a:lnRef idx="2">
+              <a:schemeClr val="accent1"/>
+            </a:lnRef>
+            <a:fillRef idx="1">
+              <a:schemeClr val="lt1"/>
+            </a:fillRef>
+            <a:effectRef idx="0">
+              <a:schemeClr val="accent1"/>
+            </a:effectRef>
+            <a:fontRef idx="minor">
+              <a:schemeClr val="dk1"/>
+            </a:fontRef>
+          </p:style>
+          <p:txBody>
+            <a:bodyPr rtlCol="0" anchor="ctr"/>
+            <a:lstStyle/>
+            <a:p>
+              <a:pPr algn="ctr"/>
+              <a:endParaRPr lang="nb-NO"/>
+            </a:p>
+          </p:txBody>
+        </p:sp>
+        <p:sp>
+          <p:nvSpPr>
+            <p:cNvPr id="431" name="Rektangel 430">
+              <a:extLst>
+                <a:ext uri="{FF2B5EF4-FFF2-40B4-BE49-F238E27FC236}">
+                  <a16:creationId xmlns:a16="http://schemas.microsoft.com/office/drawing/2014/main" id="{01F1EF67-8185-4AEA-BB84-030F5E38D70B}"/>
+                </a:ext>
+              </a:extLst>
+            </p:cNvPr>
+            <p:cNvSpPr/>
+            <p:nvPr/>
+          </p:nvSpPr>
+          <p:spPr>
+            <a:xfrm>
+              <a:off x="6142922" y="2839015"/>
+              <a:ext cx="216849" cy="475679"/>
+            </a:xfrm>
+            <a:prstGeom prst="rect">
+              <a:avLst/>
+            </a:prstGeom>
+            <a:ln>
+              <a:noFill/>
+            </a:ln>
+          </p:spPr>
+          <p:style>
+            <a:lnRef idx="2">
+              <a:schemeClr val="accent1">
+                <a:shade val="50000"/>
+              </a:schemeClr>
+            </a:lnRef>
+            <a:fillRef idx="1001">
+              <a:schemeClr val="lt1"/>
+            </a:fillRef>
+            <a:effectRef idx="0">
+              <a:schemeClr val="accent1"/>
+            </a:effectRef>
+            <a:fontRef idx="minor">
+              <a:schemeClr val="lt1"/>
+            </a:fontRef>
+          </p:style>
+          <p:txBody>
+            <a:bodyPr rtlCol="0" anchor="ctr"/>
+            <a:lstStyle/>
+            <a:p>
+              <a:pPr algn="ctr"/>
+              <a:endParaRPr lang="nb-NO"/>
+            </a:p>
+          </p:txBody>
+        </p:sp>
+      </p:grpSp>
+      <p:grpSp>
+        <p:nvGrpSpPr>
+          <p:cNvPr id="426" name="Gruppe 425">
+            <a:extLst>
+              <a:ext uri="{FF2B5EF4-FFF2-40B4-BE49-F238E27FC236}">
+                <a16:creationId xmlns:a16="http://schemas.microsoft.com/office/drawing/2014/main" id="{4F22C6E4-A1CF-46A6-B8DE-03A7286B8339}"/>
+              </a:ext>
+            </a:extLst>
+          </p:cNvPr>
+          <p:cNvGrpSpPr/>
+          <p:nvPr/>
+        </p:nvGrpSpPr>
+        <p:grpSpPr>
+          <a:xfrm rot="16200000">
+            <a:off x="6987802" y="4270025"/>
+            <a:ext cx="307747" cy="366694"/>
+            <a:chOff x="6142922" y="2839015"/>
+            <a:chExt cx="399212" cy="475679"/>
+          </a:xfrm>
+        </p:grpSpPr>
+        <p:sp>
+          <p:nvSpPr>
+            <p:cNvPr id="427" name="Ellipse 426">
+              <a:extLst>
+                <a:ext uri="{FF2B5EF4-FFF2-40B4-BE49-F238E27FC236}">
+                  <a16:creationId xmlns:a16="http://schemas.microsoft.com/office/drawing/2014/main" id="{8A4FC9CC-A3E0-4D7A-92B7-959268ED5A8C}"/>
+                </a:ext>
+              </a:extLst>
+            </p:cNvPr>
+            <p:cNvSpPr/>
+            <p:nvPr/>
+          </p:nvSpPr>
+          <p:spPr>
+            <a:xfrm>
+              <a:off x="6177467" y="2898468"/>
+              <a:ext cx="364667" cy="364667"/>
+            </a:xfrm>
+            <a:prstGeom prst="ellipse">
+              <a:avLst/>
+            </a:prstGeom>
+          </p:spPr>
+          <p:style>
+            <a:lnRef idx="2">
+              <a:schemeClr val="accent1"/>
+            </a:lnRef>
+            <a:fillRef idx="1">
+              <a:schemeClr val="lt1"/>
+            </a:fillRef>
+            <a:effectRef idx="0">
+              <a:schemeClr val="accent1"/>
+            </a:effectRef>
+            <a:fontRef idx="minor">
+              <a:schemeClr val="dk1"/>
+            </a:fontRef>
+          </p:style>
+          <p:txBody>
+            <a:bodyPr rtlCol="0" anchor="ctr"/>
+            <a:lstStyle/>
+            <a:p>
+              <a:pPr algn="ctr"/>
+              <a:endParaRPr lang="nb-NO"/>
+            </a:p>
+          </p:txBody>
+        </p:sp>
+        <p:sp>
+          <p:nvSpPr>
+            <p:cNvPr id="428" name="Rektangel 427">
+              <a:extLst>
+                <a:ext uri="{FF2B5EF4-FFF2-40B4-BE49-F238E27FC236}">
+                  <a16:creationId xmlns:a16="http://schemas.microsoft.com/office/drawing/2014/main" id="{5396678F-0198-4A71-AD80-6B472CD7D47E}"/>
+                </a:ext>
+              </a:extLst>
+            </p:cNvPr>
+            <p:cNvSpPr/>
+            <p:nvPr/>
+          </p:nvSpPr>
+          <p:spPr>
+            <a:xfrm>
+              <a:off x="6142922" y="2839015"/>
+              <a:ext cx="216849" cy="475679"/>
+            </a:xfrm>
+            <a:prstGeom prst="rect">
+              <a:avLst/>
+            </a:prstGeom>
+            <a:ln>
+              <a:noFill/>
+            </a:ln>
+          </p:spPr>
+          <p:style>
+            <a:lnRef idx="2">
+              <a:schemeClr val="accent1">
+                <a:shade val="50000"/>
+              </a:schemeClr>
+            </a:lnRef>
+            <a:fillRef idx="1001">
+              <a:schemeClr val="lt1"/>
+            </a:fillRef>
+            <a:effectRef idx="0">
+              <a:schemeClr val="accent1"/>
+            </a:effectRef>
+            <a:fontRef idx="minor">
+              <a:schemeClr val="lt1"/>
+            </a:fontRef>
+          </p:style>
+          <p:txBody>
+            <a:bodyPr rtlCol="0" anchor="ctr"/>
+            <a:lstStyle/>
+            <a:p>
+              <a:pPr algn="ctr"/>
+              <a:endParaRPr lang="nb-NO"/>
+            </a:p>
+          </p:txBody>
+        </p:sp>
+      </p:grpSp>
+      <p:grpSp>
+        <p:nvGrpSpPr>
           <p:cNvPr id="514" name="Gruppe 513">
             <a:extLst>
               <a:ext uri="{FF2B5EF4-FFF2-40B4-BE49-F238E27FC236}">
@@ -24479,6 +25179,11 @@
           <a:prstGeom prst="line">
             <a:avLst/>
           </a:prstGeom>
+          <a:ln w="57150">
+            <a:solidFill>
+              <a:schemeClr val="tx1"/>
+            </a:solidFill>
+          </a:ln>
         </p:spPr>
         <p:style>
           <a:lnRef idx="1">
@@ -24517,6 +25222,11 @@
           <a:prstGeom prst="line">
             <a:avLst/>
           </a:prstGeom>
+          <a:ln w="38100">
+            <a:solidFill>
+              <a:srgbClr val="FF0000"/>
+            </a:solidFill>
+          </a:ln>
         </p:spPr>
         <p:style>
           <a:lnRef idx="1">
@@ -27905,7 +28615,7 @@
           <a:prstGeom prst="line">
             <a:avLst/>
           </a:prstGeom>
-          <a:ln>
+          <a:ln w="9525">
             <a:solidFill>
               <a:srgbClr val="FF0000"/>
             </a:solidFill>
@@ -27948,7 +28658,7 @@
           <a:prstGeom prst="line">
             <a:avLst/>
           </a:prstGeom>
-          <a:ln>
+          <a:ln w="9525">
             <a:solidFill>
               <a:srgbClr val="FF0000"/>
             </a:solidFill>
@@ -27991,7 +28701,7 @@
           <a:prstGeom prst="line">
             <a:avLst/>
           </a:prstGeom>
-          <a:ln>
+          <a:ln w="9525">
             <a:solidFill>
               <a:srgbClr val="FF0000"/>
             </a:solidFill>
@@ -28034,7 +28744,7 @@
           <a:prstGeom prst="line">
             <a:avLst/>
           </a:prstGeom>
-          <a:ln>
+          <a:ln w="9525">
             <a:solidFill>
               <a:srgbClr val="FF0000"/>
             </a:solidFill>
@@ -28159,7 +28869,7 @@
           <a:prstGeom prst="line">
             <a:avLst/>
           </a:prstGeom>
-          <a:ln>
+          <a:ln w="9525">
             <a:solidFill>
               <a:srgbClr val="FF0000"/>
             </a:solidFill>
@@ -28202,7 +28912,7 @@
           <a:prstGeom prst="line">
             <a:avLst/>
           </a:prstGeom>
-          <a:ln>
+          <a:ln w="9525">
             <a:solidFill>
               <a:srgbClr val="FF0000"/>
             </a:solidFill>
@@ -28293,8 +29003,8 @@
         </p:nvCxnSpPr>
         <p:spPr>
           <a:xfrm flipV="1">
-            <a:off x="7611605" y="3053406"/>
-            <a:ext cx="0" cy="2071692"/>
+            <a:off x="7781913" y="3053406"/>
+            <a:ext cx="0" cy="2089057"/>
           </a:xfrm>
           <a:prstGeom prst="line">
             <a:avLst/>
@@ -28331,8 +29041,8 @@
         </p:nvCxnSpPr>
         <p:spPr>
           <a:xfrm>
-            <a:off x="7611605" y="3053406"/>
-            <a:ext cx="2024204" cy="0"/>
+            <a:off x="7781913" y="3053406"/>
+            <a:ext cx="1853896" cy="0"/>
           </a:xfrm>
           <a:prstGeom prst="line">
             <a:avLst/>
@@ -28446,7 +29156,7 @@
         <p:spPr>
           <a:xfrm>
             <a:off x="6478184" y="5001688"/>
-            <a:ext cx="1029769" cy="0"/>
+            <a:ext cx="1203817" cy="0"/>
           </a:xfrm>
           <a:prstGeom prst="line">
             <a:avLst/>
@@ -28484,7 +29194,7 @@
         <p:spPr>
           <a:xfrm>
             <a:off x="6472872" y="5139118"/>
-            <a:ext cx="1138733" cy="0"/>
+            <a:ext cx="1309041" cy="0"/>
           </a:xfrm>
           <a:prstGeom prst="line">
             <a:avLst/>
@@ -28521,8 +29231,8 @@
         </p:nvCxnSpPr>
         <p:spPr>
           <a:xfrm flipV="1">
-            <a:off x="7507953" y="2949248"/>
-            <a:ext cx="0" cy="2047647"/>
+            <a:off x="7682001" y="2943739"/>
+            <a:ext cx="0" cy="2057949"/>
           </a:xfrm>
           <a:prstGeom prst="line">
             <a:avLst/>
@@ -28559,8 +29269,8 @@
         </p:nvCxnSpPr>
         <p:spPr>
           <a:xfrm>
-            <a:off x="7513722" y="2949248"/>
-            <a:ext cx="2242156" cy="0"/>
+            <a:off x="7682001" y="2949248"/>
+            <a:ext cx="2073877" cy="0"/>
           </a:xfrm>
           <a:prstGeom prst="line">
             <a:avLst/>
@@ -28679,7 +29389,7 @@
           <a:prstGeom prst="line">
             <a:avLst/>
           </a:prstGeom>
-          <a:ln>
+          <a:ln w="9525">
             <a:solidFill>
               <a:srgbClr val="FF0000"/>
             </a:solidFill>
@@ -28722,7 +29432,7 @@
           <a:prstGeom prst="line">
             <a:avLst/>
           </a:prstGeom>
-          <a:ln>
+          <a:ln w="9525">
             <a:solidFill>
               <a:srgbClr val="FF0000"/>
             </a:solidFill>
@@ -28763,7 +29473,7 @@
           <a:prstGeom prst="line">
             <a:avLst/>
           </a:prstGeom>
-          <a:ln>
+          <a:ln w="9525">
             <a:solidFill>
               <a:srgbClr val="FF0000"/>
             </a:solidFill>
@@ -28806,7 +29516,7 @@
           <a:prstGeom prst="line">
             <a:avLst/>
           </a:prstGeom>
-          <a:ln>
+          <a:ln w="9525">
             <a:solidFill>
               <a:schemeClr val="tx1"/>
             </a:solidFill>
@@ -28849,7 +29559,7 @@
           <a:prstGeom prst="line">
             <a:avLst/>
           </a:prstGeom>
-          <a:ln>
+          <a:ln w="9525">
             <a:solidFill>
               <a:schemeClr val="tx1"/>
             </a:solidFill>
@@ -30596,7 +31306,7 @@
           <a:prstGeom prst="line">
             <a:avLst/>
           </a:prstGeom>
-          <a:ln>
+          <a:ln w="9525">
             <a:solidFill>
               <a:srgbClr val="FF0000"/>
             </a:solidFill>
@@ -30639,7 +31349,7 @@
           <a:prstGeom prst="line">
             <a:avLst/>
           </a:prstGeom>
-          <a:ln>
+          <a:ln w="9525">
             <a:solidFill>
               <a:srgbClr val="FF0000"/>
             </a:solidFill>
@@ -30682,7 +31392,7 @@
           <a:prstGeom prst="line">
             <a:avLst/>
           </a:prstGeom>
-          <a:ln>
+          <a:ln w="9525">
             <a:solidFill>
               <a:schemeClr val="tx1"/>
             </a:solidFill>
@@ -30725,7 +31435,7 @@
           <a:prstGeom prst="line">
             <a:avLst/>
           </a:prstGeom>
-          <a:ln>
+          <a:ln w="9525">
             <a:solidFill>
               <a:schemeClr val="tx1"/>
             </a:solidFill>
@@ -30768,7 +31478,7 @@
           <a:prstGeom prst="line">
             <a:avLst/>
           </a:prstGeom>
-          <a:ln>
+          <a:ln w="9525">
             <a:solidFill>
               <a:schemeClr val="tx1"/>
             </a:solidFill>
@@ -30811,7 +31521,7 @@
           <a:prstGeom prst="line">
             <a:avLst/>
           </a:prstGeom>
-          <a:ln>
+          <a:ln w="9525">
             <a:solidFill>
               <a:schemeClr val="tx1"/>
             </a:solidFill>
@@ -30852,7 +31562,7 @@
           <a:prstGeom prst="line">
             <a:avLst/>
           </a:prstGeom>
-          <a:ln>
+          <a:ln w="9525">
             <a:solidFill>
               <a:schemeClr val="tx1"/>
             </a:solidFill>
@@ -30893,7 +31603,7 @@
           <a:prstGeom prst="line">
             <a:avLst/>
           </a:prstGeom>
-          <a:ln>
+          <a:ln w="9525">
             <a:solidFill>
               <a:schemeClr val="tx1"/>
             </a:solidFill>
@@ -30936,7 +31646,7 @@
           <a:prstGeom prst="line">
             <a:avLst/>
           </a:prstGeom>
-          <a:ln>
+          <a:ln w="9525">
             <a:solidFill>
               <a:srgbClr val="FF0000"/>
             </a:solidFill>
@@ -30979,7 +31689,7 @@
           <a:prstGeom prst="line">
             <a:avLst/>
           </a:prstGeom>
-          <a:ln>
+          <a:ln w="9525">
             <a:solidFill>
               <a:srgbClr val="FF0000"/>
             </a:solidFill>
@@ -31022,7 +31732,7 @@
           <a:prstGeom prst="line">
             <a:avLst/>
           </a:prstGeom>
-          <a:ln>
+          <a:ln w="9525">
             <a:solidFill>
               <a:srgbClr val="FF0000"/>
             </a:solidFill>
@@ -31065,7 +31775,7 @@
           <a:prstGeom prst="line">
             <a:avLst/>
           </a:prstGeom>
-          <a:ln>
+          <a:ln w="9525">
             <a:solidFill>
               <a:srgbClr val="FF0000"/>
             </a:solidFill>
@@ -31596,7 +32306,7 @@
         </p:nvCxnSpPr>
         <p:spPr>
           <a:xfrm>
-            <a:off x="7098051" y="2180429"/>
+            <a:off x="7088832" y="2058951"/>
             <a:ext cx="2027550" cy="0"/>
           </a:xfrm>
           <a:prstGeom prst="line">
@@ -31634,8 +32344,8 @@
         </p:nvCxnSpPr>
         <p:spPr>
           <a:xfrm>
-            <a:off x="7094574" y="2180429"/>
-            <a:ext cx="0" cy="2403740"/>
+            <a:off x="7094574" y="2056572"/>
+            <a:ext cx="0" cy="2527597"/>
           </a:xfrm>
           <a:prstGeom prst="line">
             <a:avLst/>
@@ -31672,8 +32382,8 @@
         </p:nvCxnSpPr>
         <p:spPr>
           <a:xfrm>
-            <a:off x="7156589" y="2447560"/>
-            <a:ext cx="0" cy="2268918"/>
+            <a:off x="7156589" y="2180429"/>
+            <a:ext cx="0" cy="2536049"/>
           </a:xfrm>
           <a:prstGeom prst="line">
             <a:avLst/>
@@ -31710,7 +32420,7 @@
         </p:nvCxnSpPr>
         <p:spPr>
           <a:xfrm>
-            <a:off x="7156589" y="2447560"/>
+            <a:off x="7156589" y="2180429"/>
             <a:ext cx="2166240" cy="0"/>
           </a:xfrm>
           <a:prstGeom prst="line">
@@ -31748,8 +32458,8 @@
         </p:nvCxnSpPr>
         <p:spPr>
           <a:xfrm>
-            <a:off x="7223265" y="2712299"/>
-            <a:ext cx="0" cy="2149817"/>
+            <a:off x="7223265" y="2334601"/>
+            <a:ext cx="0" cy="2527515"/>
           </a:xfrm>
           <a:prstGeom prst="line">
             <a:avLst/>
@@ -34012,7 +34722,7 @@
         <p:spPr>
           <a:xfrm>
             <a:off x="9125601" y="1800164"/>
-            <a:ext cx="0" cy="380265"/>
+            <a:ext cx="0" cy="256408"/>
           </a:xfrm>
           <a:prstGeom prst="line">
             <a:avLst/>
@@ -34050,7 +34760,7 @@
         <p:spPr>
           <a:xfrm>
             <a:off x="9322829" y="1822671"/>
-            <a:ext cx="0" cy="624889"/>
+            <a:ext cx="0" cy="357758"/>
           </a:xfrm>
           <a:prstGeom prst="line">
             <a:avLst/>
@@ -34088,7 +34798,7 @@
         <p:spPr>
           <a:xfrm>
             <a:off x="9521197" y="1801224"/>
-            <a:ext cx="0" cy="919925"/>
+            <a:ext cx="0" cy="533377"/>
           </a:xfrm>
           <a:prstGeom prst="line">
             <a:avLst/>
@@ -34172,13 +34882,13 @@
         </p:spPr>
         <p:style>
           <a:lnRef idx="1">
-            <a:schemeClr val="dk1"/>
+            <a:schemeClr val="accent1"/>
           </a:lnRef>
           <a:fillRef idx="0">
-            <a:schemeClr val="dk1"/>
+            <a:schemeClr val="accent1"/>
           </a:fillRef>
           <a:effectRef idx="0">
-            <a:schemeClr val="dk1"/>
+            <a:schemeClr val="accent1"/>
           </a:effectRef>
           <a:fontRef idx="minor">
             <a:schemeClr val="tx1"/>
@@ -34245,14 +34955,14 @@
           </a:prstGeom>
         </p:spPr>
         <p:style>
-          <a:lnRef idx="1">
-            <a:schemeClr val="accent1"/>
+          <a:lnRef idx="2">
+            <a:schemeClr val="dk1"/>
           </a:lnRef>
           <a:fillRef idx="0">
-            <a:schemeClr val="accent1"/>
+            <a:schemeClr val="dk1"/>
           </a:fillRef>
-          <a:effectRef idx="0">
-            <a:schemeClr val="accent1"/>
+          <a:effectRef idx="1">
+            <a:schemeClr val="dk1"/>
           </a:effectRef>
           <a:fontRef idx="minor">
             <a:schemeClr val="tx1"/>
@@ -34283,14 +34993,14 @@
           </a:prstGeom>
         </p:spPr>
         <p:style>
-          <a:lnRef idx="1">
-            <a:schemeClr val="accent1"/>
+          <a:lnRef idx="2">
+            <a:schemeClr val="dk1"/>
           </a:lnRef>
           <a:fillRef idx="0">
-            <a:schemeClr val="accent1"/>
+            <a:schemeClr val="dk1"/>
           </a:fillRef>
-          <a:effectRef idx="0">
-            <a:schemeClr val="accent1"/>
+          <a:effectRef idx="1">
+            <a:schemeClr val="dk1"/>
           </a:effectRef>
           <a:fontRef idx="minor">
             <a:schemeClr val="tx1"/>
@@ -34321,13 +35031,13 @@
           </a:prstGeom>
         </p:spPr>
         <p:style>
-          <a:lnRef idx="1">
+          <a:lnRef idx="2">
             <a:schemeClr val="dk1"/>
           </a:lnRef>
           <a:fillRef idx="0">
             <a:schemeClr val="dk1"/>
           </a:fillRef>
-          <a:effectRef idx="0">
+          <a:effectRef idx="1">
             <a:schemeClr val="dk1"/>
           </a:effectRef>
           <a:fontRef idx="minor">
@@ -34436,13 +35146,13 @@
         </p:spPr>
         <p:style>
           <a:lnRef idx="1">
-            <a:schemeClr val="dk1"/>
+            <a:schemeClr val="accent1"/>
           </a:lnRef>
           <a:fillRef idx="0">
-            <a:schemeClr val="dk1"/>
+            <a:schemeClr val="accent1"/>
           </a:fillRef>
           <a:effectRef idx="0">
-            <a:schemeClr val="dk1"/>
+            <a:schemeClr val="accent1"/>
           </a:effectRef>
           <a:fontRef idx="minor">
             <a:schemeClr val="tx1"/>
@@ -34850,8 +35560,388 @@
         </p:nvCxnSpPr>
         <p:spPr>
           <a:xfrm>
-            <a:off x="7218502" y="2712299"/>
+            <a:off x="7218502" y="2334601"/>
             <a:ext cx="2302695" cy="0"/>
+          </a:xfrm>
+          <a:prstGeom prst="line">
+            <a:avLst/>
+          </a:prstGeom>
+        </p:spPr>
+        <p:style>
+          <a:lnRef idx="1">
+            <a:schemeClr val="accent1"/>
+          </a:lnRef>
+          <a:fillRef idx="0">
+            <a:schemeClr val="accent1"/>
+          </a:fillRef>
+          <a:effectRef idx="0">
+            <a:schemeClr val="accent1"/>
+          </a:effectRef>
+          <a:fontRef idx="minor">
+            <a:schemeClr val="tx1"/>
+          </a:fontRef>
+        </p:style>
+      </p:cxnSp>
+      <p:cxnSp>
+        <p:nvCxnSpPr>
+          <p:cNvPr id="432" name="Rett linje 431">
+            <a:extLst>
+              <a:ext uri="{FF2B5EF4-FFF2-40B4-BE49-F238E27FC236}">
+                <a16:creationId xmlns:a16="http://schemas.microsoft.com/office/drawing/2014/main" id="{6F8CE550-6A49-4A28-827D-CC3A6AEE34C9}"/>
+              </a:ext>
+            </a:extLst>
+          </p:cNvPr>
+          <p:cNvCxnSpPr>
+            <a:cxnSpLocks/>
+          </p:cNvCxnSpPr>
+          <p:nvPr/>
+        </p:nvCxnSpPr>
+        <p:spPr>
+          <a:xfrm>
+            <a:off x="6454453" y="4433927"/>
+            <a:ext cx="555211" cy="0"/>
+          </a:xfrm>
+          <a:prstGeom prst="line">
+            <a:avLst/>
+          </a:prstGeom>
+        </p:spPr>
+        <p:style>
+          <a:lnRef idx="1">
+            <a:schemeClr val="accent1"/>
+          </a:lnRef>
+          <a:fillRef idx="0">
+            <a:schemeClr val="accent1"/>
+          </a:fillRef>
+          <a:effectRef idx="0">
+            <a:schemeClr val="accent1"/>
+          </a:effectRef>
+          <a:fontRef idx="minor">
+            <a:schemeClr val="tx1"/>
+          </a:fontRef>
+        </p:style>
+      </p:cxnSp>
+      <p:cxnSp>
+        <p:nvCxnSpPr>
+          <p:cNvPr id="434" name="Rett linje 433">
+            <a:extLst>
+              <a:ext uri="{FF2B5EF4-FFF2-40B4-BE49-F238E27FC236}">
+                <a16:creationId xmlns:a16="http://schemas.microsoft.com/office/drawing/2014/main" id="{1925CAF6-9C19-4D79-8B3C-C5D375D4AA9F}"/>
+              </a:ext>
+            </a:extLst>
+          </p:cNvPr>
+          <p:cNvCxnSpPr>
+            <a:cxnSpLocks/>
+          </p:cNvCxnSpPr>
+          <p:nvPr/>
+        </p:nvCxnSpPr>
+        <p:spPr>
+          <a:xfrm>
+            <a:off x="6463403" y="4297995"/>
+            <a:ext cx="555211" cy="0"/>
+          </a:xfrm>
+          <a:prstGeom prst="line">
+            <a:avLst/>
+          </a:prstGeom>
+        </p:spPr>
+        <p:style>
+          <a:lnRef idx="1">
+            <a:schemeClr val="accent1"/>
+          </a:lnRef>
+          <a:fillRef idx="0">
+            <a:schemeClr val="accent1"/>
+          </a:fillRef>
+          <a:effectRef idx="0">
+            <a:schemeClr val="accent1"/>
+          </a:effectRef>
+          <a:fontRef idx="minor">
+            <a:schemeClr val="tx1"/>
+          </a:fontRef>
+        </p:style>
+      </p:cxnSp>
+      <p:cxnSp>
+        <p:nvCxnSpPr>
+          <p:cNvPr id="435" name="Rett linje 434">
+            <a:extLst>
+              <a:ext uri="{FF2B5EF4-FFF2-40B4-BE49-F238E27FC236}">
+                <a16:creationId xmlns:a16="http://schemas.microsoft.com/office/drawing/2014/main" id="{85266B9B-E7DD-412C-90E1-C02F66149840}"/>
+              </a:ext>
+            </a:extLst>
+          </p:cNvPr>
+          <p:cNvCxnSpPr>
+            <a:cxnSpLocks/>
+          </p:cNvCxnSpPr>
+          <p:nvPr/>
+        </p:nvCxnSpPr>
+        <p:spPr>
+          <a:xfrm>
+            <a:off x="7292476" y="4433927"/>
+            <a:ext cx="209388" cy="0"/>
+          </a:xfrm>
+          <a:prstGeom prst="line">
+            <a:avLst/>
+          </a:prstGeom>
+        </p:spPr>
+        <p:style>
+          <a:lnRef idx="1">
+            <a:schemeClr val="accent1"/>
+          </a:lnRef>
+          <a:fillRef idx="0">
+            <a:schemeClr val="accent1"/>
+          </a:fillRef>
+          <a:effectRef idx="0">
+            <a:schemeClr val="accent1"/>
+          </a:effectRef>
+          <a:fontRef idx="minor">
+            <a:schemeClr val="tx1"/>
+          </a:fontRef>
+        </p:style>
+      </p:cxnSp>
+      <p:cxnSp>
+        <p:nvCxnSpPr>
+          <p:cNvPr id="437" name="Rett linje 436">
+            <a:extLst>
+              <a:ext uri="{FF2B5EF4-FFF2-40B4-BE49-F238E27FC236}">
+                <a16:creationId xmlns:a16="http://schemas.microsoft.com/office/drawing/2014/main" id="{6398E7B1-8DE4-4653-9E69-97E437809541}"/>
+              </a:ext>
+            </a:extLst>
+          </p:cNvPr>
+          <p:cNvCxnSpPr>
+            <a:cxnSpLocks/>
+          </p:cNvCxnSpPr>
+          <p:nvPr/>
+        </p:nvCxnSpPr>
+        <p:spPr>
+          <a:xfrm>
+            <a:off x="7285277" y="4304343"/>
+            <a:ext cx="92414" cy="0"/>
+          </a:xfrm>
+          <a:prstGeom prst="line">
+            <a:avLst/>
+          </a:prstGeom>
+        </p:spPr>
+        <p:style>
+          <a:lnRef idx="1">
+            <a:schemeClr val="accent1"/>
+          </a:lnRef>
+          <a:fillRef idx="0">
+            <a:schemeClr val="accent1"/>
+          </a:fillRef>
+          <a:effectRef idx="0">
+            <a:schemeClr val="accent1"/>
+          </a:effectRef>
+          <a:fontRef idx="minor">
+            <a:schemeClr val="tx1"/>
+          </a:fontRef>
+        </p:style>
+      </p:cxnSp>
+      <p:cxnSp>
+        <p:nvCxnSpPr>
+          <p:cNvPr id="439" name="Rett linje 438">
+            <a:extLst>
+              <a:ext uri="{FF2B5EF4-FFF2-40B4-BE49-F238E27FC236}">
+                <a16:creationId xmlns:a16="http://schemas.microsoft.com/office/drawing/2014/main" id="{B176A15A-F775-4252-A113-40E84AAC2459}"/>
+              </a:ext>
+            </a:extLst>
+          </p:cNvPr>
+          <p:cNvCxnSpPr>
+            <a:cxnSpLocks/>
+          </p:cNvCxnSpPr>
+          <p:nvPr/>
+        </p:nvCxnSpPr>
+        <p:spPr>
+          <a:xfrm flipV="1">
+            <a:off x="7377691" y="2512153"/>
+            <a:ext cx="0" cy="1791876"/>
+          </a:xfrm>
+          <a:prstGeom prst="line">
+            <a:avLst/>
+          </a:prstGeom>
+        </p:spPr>
+        <p:style>
+          <a:lnRef idx="1">
+            <a:schemeClr val="accent1"/>
+          </a:lnRef>
+          <a:fillRef idx="0">
+            <a:schemeClr val="accent1"/>
+          </a:fillRef>
+          <a:effectRef idx="0">
+            <a:schemeClr val="accent1"/>
+          </a:effectRef>
+          <a:fontRef idx="minor">
+            <a:schemeClr val="tx1"/>
+          </a:fontRef>
+        </p:style>
+      </p:cxnSp>
+      <p:cxnSp>
+        <p:nvCxnSpPr>
+          <p:cNvPr id="441" name="Rett linje 440">
+            <a:extLst>
+              <a:ext uri="{FF2B5EF4-FFF2-40B4-BE49-F238E27FC236}">
+                <a16:creationId xmlns:a16="http://schemas.microsoft.com/office/drawing/2014/main" id="{D807C399-8CC1-4060-811F-C09E3E75290D}"/>
+              </a:ext>
+            </a:extLst>
+          </p:cNvPr>
+          <p:cNvCxnSpPr>
+            <a:cxnSpLocks/>
+          </p:cNvCxnSpPr>
+          <p:nvPr/>
+        </p:nvCxnSpPr>
+        <p:spPr>
+          <a:xfrm flipV="1">
+            <a:off x="7501864" y="2638970"/>
+            <a:ext cx="0" cy="1791876"/>
+          </a:xfrm>
+          <a:prstGeom prst="line">
+            <a:avLst/>
+          </a:prstGeom>
+        </p:spPr>
+        <p:style>
+          <a:lnRef idx="1">
+            <a:schemeClr val="accent1"/>
+          </a:lnRef>
+          <a:fillRef idx="0">
+            <a:schemeClr val="accent1"/>
+          </a:fillRef>
+          <a:effectRef idx="0">
+            <a:schemeClr val="accent1"/>
+          </a:effectRef>
+          <a:fontRef idx="minor">
+            <a:schemeClr val="tx1"/>
+          </a:fontRef>
+        </p:style>
+      </p:cxnSp>
+      <p:cxnSp>
+        <p:nvCxnSpPr>
+          <p:cNvPr id="112" name="Rett linje 111">
+            <a:extLst>
+              <a:ext uri="{FF2B5EF4-FFF2-40B4-BE49-F238E27FC236}">
+                <a16:creationId xmlns:a16="http://schemas.microsoft.com/office/drawing/2014/main" id="{92753665-97AA-4426-88BE-50925464D0FD}"/>
+              </a:ext>
+            </a:extLst>
+          </p:cNvPr>
+          <p:cNvCxnSpPr>
+            <a:cxnSpLocks/>
+          </p:cNvCxnSpPr>
+          <p:nvPr/>
+        </p:nvCxnSpPr>
+        <p:spPr>
+          <a:xfrm>
+            <a:off x="7377691" y="2512153"/>
+            <a:ext cx="2366134" cy="0"/>
+          </a:xfrm>
+          <a:prstGeom prst="line">
+            <a:avLst/>
+          </a:prstGeom>
+        </p:spPr>
+        <p:style>
+          <a:lnRef idx="1">
+            <a:schemeClr val="accent1"/>
+          </a:lnRef>
+          <a:fillRef idx="0">
+            <a:schemeClr val="accent1"/>
+          </a:fillRef>
+          <a:effectRef idx="0">
+            <a:schemeClr val="accent1"/>
+          </a:effectRef>
+          <a:fontRef idx="minor">
+            <a:schemeClr val="tx1"/>
+          </a:fontRef>
+        </p:style>
+      </p:cxnSp>
+      <p:cxnSp>
+        <p:nvCxnSpPr>
+          <p:cNvPr id="444" name="Rett linje 443">
+            <a:extLst>
+              <a:ext uri="{FF2B5EF4-FFF2-40B4-BE49-F238E27FC236}">
+                <a16:creationId xmlns:a16="http://schemas.microsoft.com/office/drawing/2014/main" id="{97897636-994D-432E-A66A-44B58978E88D}"/>
+              </a:ext>
+            </a:extLst>
+          </p:cNvPr>
+          <p:cNvCxnSpPr>
+            <a:cxnSpLocks/>
+          </p:cNvCxnSpPr>
+          <p:nvPr/>
+        </p:nvCxnSpPr>
+        <p:spPr>
+          <a:xfrm>
+            <a:off x="7501864" y="2638970"/>
+            <a:ext cx="2439691" cy="0"/>
+          </a:xfrm>
+          <a:prstGeom prst="line">
+            <a:avLst/>
+          </a:prstGeom>
+        </p:spPr>
+        <p:style>
+          <a:lnRef idx="1">
+            <a:schemeClr val="accent1"/>
+          </a:lnRef>
+          <a:fillRef idx="0">
+            <a:schemeClr val="accent1"/>
+          </a:fillRef>
+          <a:effectRef idx="0">
+            <a:schemeClr val="accent1"/>
+          </a:effectRef>
+          <a:fontRef idx="minor">
+            <a:schemeClr val="tx1"/>
+          </a:fontRef>
+        </p:style>
+      </p:cxnSp>
+      <p:cxnSp>
+        <p:nvCxnSpPr>
+          <p:cNvPr id="114" name="Rett linje 113">
+            <a:extLst>
+              <a:ext uri="{FF2B5EF4-FFF2-40B4-BE49-F238E27FC236}">
+                <a16:creationId xmlns:a16="http://schemas.microsoft.com/office/drawing/2014/main" id="{86046894-32ED-430C-82E9-51C6EA9FD923}"/>
+              </a:ext>
+            </a:extLst>
+          </p:cNvPr>
+          <p:cNvCxnSpPr>
+            <a:stCxn id="773" idx="0"/>
+          </p:cNvCxnSpPr>
+          <p:nvPr/>
+        </p:nvCxnSpPr>
+        <p:spPr>
+          <a:xfrm>
+            <a:off x="9743825" y="1782861"/>
+            <a:ext cx="0" cy="729292"/>
+          </a:xfrm>
+          <a:prstGeom prst="line">
+            <a:avLst/>
+          </a:prstGeom>
+        </p:spPr>
+        <p:style>
+          <a:lnRef idx="1">
+            <a:schemeClr val="accent1"/>
+          </a:lnRef>
+          <a:fillRef idx="0">
+            <a:schemeClr val="accent1"/>
+          </a:fillRef>
+          <a:effectRef idx="0">
+            <a:schemeClr val="accent1"/>
+          </a:effectRef>
+          <a:fontRef idx="minor">
+            <a:schemeClr val="tx1"/>
+          </a:fontRef>
+        </p:style>
+      </p:cxnSp>
+      <p:cxnSp>
+        <p:nvCxnSpPr>
+          <p:cNvPr id="447" name="Rett linje 446">
+            <a:extLst>
+              <a:ext uri="{FF2B5EF4-FFF2-40B4-BE49-F238E27FC236}">
+                <a16:creationId xmlns:a16="http://schemas.microsoft.com/office/drawing/2014/main" id="{59E36311-8E2F-4595-B4C8-4E16C265BB94}"/>
+              </a:ext>
+            </a:extLst>
+          </p:cNvPr>
+          <p:cNvCxnSpPr>
+            <a:cxnSpLocks/>
+          </p:cNvCxnSpPr>
+          <p:nvPr/>
+        </p:nvCxnSpPr>
+        <p:spPr>
+          <a:xfrm>
+            <a:off x="9941555" y="1835645"/>
+            <a:ext cx="0" cy="803325"/>
           </a:xfrm>
           <a:prstGeom prst="line">
             <a:avLst/>

</xml_diff>